<commit_message>
Updating project title and specifying FIFA game data
</commit_message>
<xml_diff>
--- a/Capstone_Final_Report/capstone_project_slide_soccer.pptx
+++ b/Capstone_Final_Report/capstone_project_slide_soccer.pptx
@@ -479,11 +479,11 @@
         </c:dLbls>
         <c:marker val="1"/>
         <c:smooth val="0"/>
-        <c:axId val="-494831040"/>
-        <c:axId val="-491127376"/>
+        <c:axId val="803751184"/>
+        <c:axId val="893598640"/>
       </c:lineChart>
       <c:catAx>
-        <c:axId val="-494831040"/>
+        <c:axId val="803751184"/>
         <c:scaling>
           <c:orientation val="minMax"/>
         </c:scaling>
@@ -529,7 +529,7 @@
             <a:endParaRPr lang="en-US"/>
           </a:p>
         </c:txPr>
-        <c:crossAx val="-491127376"/>
+        <c:crossAx val="893598640"/>
         <c:crosses val="autoZero"/>
         <c:auto val="1"/>
         <c:lblAlgn val="ctr"/>
@@ -537,7 +537,7 @@
         <c:noMultiLvlLbl val="0"/>
       </c:catAx>
       <c:valAx>
-        <c:axId val="-491127376"/>
+        <c:axId val="893598640"/>
         <c:scaling>
           <c:orientation val="minMax"/>
         </c:scaling>
@@ -546,7 +546,7 @@
         <c:majorTickMark val="none"/>
         <c:minorTickMark val="none"/>
         <c:tickLblPos val="nextTo"/>
-        <c:crossAx val="-494831040"/>
+        <c:crossAx val="803751184"/>
         <c:crosses val="autoZero"/>
         <c:crossBetween val="between"/>
       </c:valAx>
@@ -4087,6 +4087,13 @@
         </dgm:presLayoutVars>
       </dgm:prSet>
       <dgm:spPr/>
+      <dgm:t>
+        <a:bodyPr/>
+        <a:lstStyle/>
+        <a:p>
+          <a:endParaRPr lang="en-US"/>
+        </a:p>
+      </dgm:t>
     </dgm:pt>
     <dgm:pt modelId="{40453911-AE90-1E46-BCE2-0BE0B4ABB59A}" type="pres">
       <dgm:prSet presAssocID="{51878759-511C-7742-813D-D02E69F46816}" presName="parentText" presStyleLbl="node1" presStyleIdx="0" presStyleCnt="4">
@@ -4096,6 +4103,13 @@
         </dgm:presLayoutVars>
       </dgm:prSet>
       <dgm:spPr/>
+      <dgm:t>
+        <a:bodyPr/>
+        <a:lstStyle/>
+        <a:p>
+          <a:endParaRPr lang="en-US"/>
+        </a:p>
+      </dgm:t>
     </dgm:pt>
     <dgm:pt modelId="{18D62793-4639-2447-AA54-1AA885C47622}" type="pres">
       <dgm:prSet presAssocID="{51878759-511C-7742-813D-D02E69F46816}" presName="childText" presStyleLbl="revTx" presStyleIdx="0" presStyleCnt="4">
@@ -4182,6 +4196,13 @@
         </dgm:presLayoutVars>
       </dgm:prSet>
       <dgm:spPr/>
+      <dgm:t>
+        <a:bodyPr/>
+        <a:lstStyle/>
+        <a:p>
+          <a:endParaRPr lang="en-US"/>
+        </a:p>
+      </dgm:t>
     </dgm:pt>
     <dgm:pt modelId="{14C97C0B-A7EB-C248-84EC-49AE55D96938}" type="pres">
       <dgm:prSet presAssocID="{EADD679B-6501-6640-B08C-FE166566DAED}" presName="childText" presStyleLbl="revTx" presStyleIdx="3" presStyleCnt="4">
@@ -4200,23 +4221,23 @@
     </dgm:pt>
   </dgm:ptLst>
   <dgm:cxnLst>
+    <dgm:cxn modelId="{B17C4444-D321-9C4C-B249-40335030CAE7}" type="presOf" srcId="{ED00DBD4-89AA-124C-8D22-D798FD1CC6DB}" destId="{EEA56FC6-A5A7-794A-89C2-3B7CCEBB7CFF}" srcOrd="0" destOrd="0" presId="urn:microsoft.com/office/officeart/2005/8/layout/vList2"/>
+    <dgm:cxn modelId="{517BA15E-E3AD-924D-B0CF-D971F8E1E6D2}" type="presOf" srcId="{8326558F-3AA6-384A-AEE1-3021DE30A337}" destId="{1AFA89AA-FC53-5A46-8BD2-54A9523B1494}" srcOrd="0" destOrd="0" presId="urn:microsoft.com/office/officeart/2005/8/layout/vList2"/>
+    <dgm:cxn modelId="{E9859F41-8A67-FE49-ADC6-C016D8516E89}" srcId="{16082152-5382-5547-B8CD-E253D254125B}" destId="{51878759-511C-7742-813D-D02E69F46816}" srcOrd="0" destOrd="0" parTransId="{63E52B8E-1352-654C-8CD6-4349C3A6F5F7}" sibTransId="{CA8F4963-0B10-654E-B3B4-7B3CB1B384EA}"/>
+    <dgm:cxn modelId="{CE355EAA-68E5-AA4E-9847-8D9E5952AC28}" type="presOf" srcId="{39E57D7B-91CA-D64A-B4D3-489861A38C8C}" destId="{18D62793-4639-2447-AA54-1AA885C47622}" srcOrd="0" destOrd="0" presId="urn:microsoft.com/office/officeart/2005/8/layout/vList2"/>
+    <dgm:cxn modelId="{DCB4C79D-DA26-D246-BE1C-DE21E1457AFA}" srcId="{EADD679B-6501-6640-B08C-FE166566DAED}" destId="{07BF70E9-940F-7B4E-86F2-33CF2985559A}" srcOrd="0" destOrd="0" parTransId="{FD6F1B9C-4CF4-A448-8B20-942F20D8C376}" sibTransId="{A1444792-2B33-9940-8835-A53A39357AF1}"/>
+    <dgm:cxn modelId="{B1CB5793-637E-0D44-AD45-FF5AED9590F0}" type="presOf" srcId="{51878759-511C-7742-813D-D02E69F46816}" destId="{40453911-AE90-1E46-BCE2-0BE0B4ABB59A}" srcOrd="0" destOrd="0" presId="urn:microsoft.com/office/officeart/2005/8/layout/vList2"/>
+    <dgm:cxn modelId="{6FF2C3EF-E507-4444-AD42-D358F1CDAED6}" srcId="{51878759-511C-7742-813D-D02E69F46816}" destId="{39E57D7B-91CA-D64A-B4D3-489861A38C8C}" srcOrd="0" destOrd="0" parTransId="{D5D5D7B0-442F-3147-A3A2-4164F974E2CD}" sibTransId="{A1658BE0-B033-334F-A9A0-BBD55BC07288}"/>
+    <dgm:cxn modelId="{602C183A-D2F1-BF46-9747-6774061F3C0D}" srcId="{16082152-5382-5547-B8CD-E253D254125B}" destId="{8326558F-3AA6-384A-AEE1-3021DE30A337}" srcOrd="2" destOrd="0" parTransId="{FCB6EA21-261E-5644-BEAA-60142C48D258}" sibTransId="{96E58EAA-773E-CA4E-8C79-0E4E8B232057}"/>
+    <dgm:cxn modelId="{33849D83-56D7-0B46-ACC9-8934FDAEC603}" srcId="{16082152-5382-5547-B8CD-E253D254125B}" destId="{7ACAA1EC-ABDD-264B-B594-AEA3323F8E8B}" srcOrd="1" destOrd="0" parTransId="{4C3560B3-BC5B-7D46-B4B5-98685848A1C1}" sibTransId="{5BDA744F-9014-F746-9A29-1A0FAC2BAD2B}"/>
+    <dgm:cxn modelId="{BFE724E5-731E-B246-B17F-090FDAFCC488}" srcId="{8326558F-3AA6-384A-AEE1-3021DE30A337}" destId="{ED00DBD4-89AA-124C-8D22-D798FD1CC6DB}" srcOrd="0" destOrd="0" parTransId="{8D9022E4-F06D-3F46-8D17-81E2995432CD}" sibTransId="{1CEF1AFA-6076-9E48-B24B-24A6E4DD4E87}"/>
+    <dgm:cxn modelId="{8D7A2B97-3002-F74F-A626-30962DE6D2FD}" type="presOf" srcId="{7ACAA1EC-ABDD-264B-B594-AEA3323F8E8B}" destId="{1565172C-B236-C146-BD44-0C824D718245}" srcOrd="0" destOrd="0" presId="urn:microsoft.com/office/officeart/2005/8/layout/vList2"/>
+    <dgm:cxn modelId="{2464D9DF-11BE-434D-BC7C-AE625D1C3B41}" type="presOf" srcId="{FC41F621-F69F-7A46-87FA-3394A74A2BBD}" destId="{FC953FCA-53E0-1547-9C98-F243A21D3124}" srcOrd="0" destOrd="0" presId="urn:microsoft.com/office/officeart/2005/8/layout/vList2"/>
+    <dgm:cxn modelId="{8F54949A-D7CA-7246-B5F4-DCB01AA9C0B1}" type="presOf" srcId="{07BF70E9-940F-7B4E-86F2-33CF2985559A}" destId="{14C97C0B-A7EB-C248-84EC-49AE55D96938}" srcOrd="0" destOrd="0" presId="urn:microsoft.com/office/officeart/2005/8/layout/vList2"/>
+    <dgm:cxn modelId="{5500457F-BE3F-1E49-AB1F-970E6630AC28}" type="presOf" srcId="{EADD679B-6501-6640-B08C-FE166566DAED}" destId="{88FBA5C5-5792-D94D-8F46-21A11791E1C1}" srcOrd="0" destOrd="0" presId="urn:microsoft.com/office/officeart/2005/8/layout/vList2"/>
     <dgm:cxn modelId="{A60C4B09-4C2D-9748-808C-2BCDA0105A14}" type="presOf" srcId="{16082152-5382-5547-B8CD-E253D254125B}" destId="{358386AE-46D5-724C-945D-BD1CE72E6178}" srcOrd="0" destOrd="0" presId="urn:microsoft.com/office/officeart/2005/8/layout/vList2"/>
-    <dgm:cxn modelId="{B17C4444-D321-9C4C-B249-40335030CAE7}" type="presOf" srcId="{ED00DBD4-89AA-124C-8D22-D798FD1CC6DB}" destId="{EEA56FC6-A5A7-794A-89C2-3B7CCEBB7CFF}" srcOrd="0" destOrd="0" presId="urn:microsoft.com/office/officeart/2005/8/layout/vList2"/>
-    <dgm:cxn modelId="{BFE724E5-731E-B246-B17F-090FDAFCC488}" srcId="{8326558F-3AA6-384A-AEE1-3021DE30A337}" destId="{ED00DBD4-89AA-124C-8D22-D798FD1CC6DB}" srcOrd="0" destOrd="0" parTransId="{8D9022E4-F06D-3F46-8D17-81E2995432CD}" sibTransId="{1CEF1AFA-6076-9E48-B24B-24A6E4DD4E87}"/>
-    <dgm:cxn modelId="{2464D9DF-11BE-434D-BC7C-AE625D1C3B41}" type="presOf" srcId="{FC41F621-F69F-7A46-87FA-3394A74A2BBD}" destId="{FC953FCA-53E0-1547-9C98-F243A21D3124}" srcOrd="0" destOrd="0" presId="urn:microsoft.com/office/officeart/2005/8/layout/vList2"/>
-    <dgm:cxn modelId="{517BA15E-E3AD-924D-B0CF-D971F8E1E6D2}" type="presOf" srcId="{8326558F-3AA6-384A-AEE1-3021DE30A337}" destId="{1AFA89AA-FC53-5A46-8BD2-54A9523B1494}" srcOrd="0" destOrd="0" presId="urn:microsoft.com/office/officeart/2005/8/layout/vList2"/>
-    <dgm:cxn modelId="{8F54949A-D7CA-7246-B5F4-DCB01AA9C0B1}" type="presOf" srcId="{07BF70E9-940F-7B4E-86F2-33CF2985559A}" destId="{14C97C0B-A7EB-C248-84EC-49AE55D96938}" srcOrd="0" destOrd="0" presId="urn:microsoft.com/office/officeart/2005/8/layout/vList2"/>
     <dgm:cxn modelId="{D1A954D8-BA3C-BA41-BCFA-E7CB398BB1F7}" srcId="{7ACAA1EC-ABDD-264B-B594-AEA3323F8E8B}" destId="{FC41F621-F69F-7A46-87FA-3394A74A2BBD}" srcOrd="0" destOrd="0" parTransId="{A4725E07-0CB4-7547-9B06-AEE189BBE2E2}" sibTransId="{397872E2-89B9-5E43-A870-39231F9D57DD}"/>
-    <dgm:cxn modelId="{602C183A-D2F1-BF46-9747-6774061F3C0D}" srcId="{16082152-5382-5547-B8CD-E253D254125B}" destId="{8326558F-3AA6-384A-AEE1-3021DE30A337}" srcOrd="2" destOrd="0" parTransId="{FCB6EA21-261E-5644-BEAA-60142C48D258}" sibTransId="{96E58EAA-773E-CA4E-8C79-0E4E8B232057}"/>
-    <dgm:cxn modelId="{CE355EAA-68E5-AA4E-9847-8D9E5952AC28}" type="presOf" srcId="{39E57D7B-91CA-D64A-B4D3-489861A38C8C}" destId="{18D62793-4639-2447-AA54-1AA885C47622}" srcOrd="0" destOrd="0" presId="urn:microsoft.com/office/officeart/2005/8/layout/vList2"/>
-    <dgm:cxn modelId="{33849D83-56D7-0B46-ACC9-8934FDAEC603}" srcId="{16082152-5382-5547-B8CD-E253D254125B}" destId="{7ACAA1EC-ABDD-264B-B594-AEA3323F8E8B}" srcOrd="1" destOrd="0" parTransId="{4C3560B3-BC5B-7D46-B4B5-98685848A1C1}" sibTransId="{5BDA744F-9014-F746-9A29-1A0FAC2BAD2B}"/>
-    <dgm:cxn modelId="{DCB4C79D-DA26-D246-BE1C-DE21E1457AFA}" srcId="{EADD679B-6501-6640-B08C-FE166566DAED}" destId="{07BF70E9-940F-7B4E-86F2-33CF2985559A}" srcOrd="0" destOrd="0" parTransId="{FD6F1B9C-4CF4-A448-8B20-942F20D8C376}" sibTransId="{A1444792-2B33-9940-8835-A53A39357AF1}"/>
-    <dgm:cxn modelId="{8D7A2B97-3002-F74F-A626-30962DE6D2FD}" type="presOf" srcId="{7ACAA1EC-ABDD-264B-B594-AEA3323F8E8B}" destId="{1565172C-B236-C146-BD44-0C824D718245}" srcOrd="0" destOrd="0" presId="urn:microsoft.com/office/officeart/2005/8/layout/vList2"/>
-    <dgm:cxn modelId="{B1CB5793-637E-0D44-AD45-FF5AED9590F0}" type="presOf" srcId="{51878759-511C-7742-813D-D02E69F46816}" destId="{40453911-AE90-1E46-BCE2-0BE0B4ABB59A}" srcOrd="0" destOrd="0" presId="urn:microsoft.com/office/officeart/2005/8/layout/vList2"/>
     <dgm:cxn modelId="{91AA27D5-3BAA-AF43-B57A-B32604610163}" srcId="{16082152-5382-5547-B8CD-E253D254125B}" destId="{EADD679B-6501-6640-B08C-FE166566DAED}" srcOrd="3" destOrd="0" parTransId="{1E467B24-E28F-B247-ABC1-FEBC1449D915}" sibTransId="{31F240EA-AEA4-364C-A5DF-19B8D1F23BA8}"/>
-    <dgm:cxn modelId="{5500457F-BE3F-1E49-AB1F-970E6630AC28}" type="presOf" srcId="{EADD679B-6501-6640-B08C-FE166566DAED}" destId="{88FBA5C5-5792-D94D-8F46-21A11791E1C1}" srcOrd="0" destOrd="0" presId="urn:microsoft.com/office/officeart/2005/8/layout/vList2"/>
-    <dgm:cxn modelId="{6FF2C3EF-E507-4444-AD42-D358F1CDAED6}" srcId="{51878759-511C-7742-813D-D02E69F46816}" destId="{39E57D7B-91CA-D64A-B4D3-489861A38C8C}" srcOrd="0" destOrd="0" parTransId="{D5D5D7B0-442F-3147-A3A2-4164F974E2CD}" sibTransId="{A1658BE0-B033-334F-A9A0-BBD55BC07288}"/>
-    <dgm:cxn modelId="{E9859F41-8A67-FE49-ADC6-C016D8516E89}" srcId="{16082152-5382-5547-B8CD-E253D254125B}" destId="{51878759-511C-7742-813D-D02E69F46816}" srcOrd="0" destOrd="0" parTransId="{63E52B8E-1352-654C-8CD6-4349C3A6F5F7}" sibTransId="{CA8F4963-0B10-654E-B3B4-7B3CB1B384EA}"/>
     <dgm:cxn modelId="{49832A80-19EE-6848-8879-972A61E99BD4}" type="presParOf" srcId="{358386AE-46D5-724C-945D-BD1CE72E6178}" destId="{40453911-AE90-1E46-BCE2-0BE0B4ABB59A}" srcOrd="0" destOrd="0" presId="urn:microsoft.com/office/officeart/2005/8/layout/vList2"/>
     <dgm:cxn modelId="{FBF7EFB4-4078-7B49-87DA-A209972CD06E}" type="presParOf" srcId="{358386AE-46D5-724C-945D-BD1CE72E6178}" destId="{18D62793-4639-2447-AA54-1AA885C47622}" srcOrd="1" destOrd="0" presId="urn:microsoft.com/office/officeart/2005/8/layout/vList2"/>
     <dgm:cxn modelId="{F3C69AE1-6A34-0A4E-A539-4BFB8738C69F}" type="presParOf" srcId="{358386AE-46D5-724C-945D-BD1CE72E6178}" destId="{1565172C-B236-C146-BD44-0C824D718245}" srcOrd="2" destOrd="0" presId="urn:microsoft.com/office/officeart/2005/8/layout/vList2"/>
@@ -12219,7 +12240,7 @@
           <a:p>
             <a:pPr algn="l"/>
             <a:r>
-              <a:rPr lang="en-US" sz="2800" b="1" dirty="0">
+              <a:rPr lang="en-US" sz="2800" b="1" dirty="0" smtClean="0">
                 <a:solidFill>
                   <a:srgbClr val="808080"/>
                 </a:solidFill>
@@ -12228,7 +12249,7 @@
                 <a:cs typeface="Aller Display"/>
                 <a:sym typeface="Aller Display"/>
               </a:rPr>
-              <a:t>Identifying Top Players and Significant Player Attributes Based on Player Position for European </a:t>
+              <a:t>Predicting Player Rating by </a:t>
             </a:r>
             <a:r>
               <a:rPr lang="en-US" sz="2800" b="1" dirty="0">
@@ -12240,17 +12261,8 @@
                 <a:cs typeface="Aller Display"/>
                 <a:sym typeface="Aller Display"/>
               </a:rPr>
-              <a:t>Football</a:t>
-            </a:r>
-            <a:endParaRPr lang="en-US" sz="2800" b="1" dirty="0">
-              <a:solidFill>
-                <a:srgbClr val="808080"/>
-              </a:solidFill>
-              <a:latin typeface="Aller Display"/>
-              <a:ea typeface="Aller Display"/>
-              <a:cs typeface="Aller Display"/>
-              <a:sym typeface="Aller Display"/>
-            </a:endParaRPr>
+              <a:t>Player Position for European Football</a:t>
+            </a:r>
           </a:p>
         </p:txBody>
       </p:sp>
@@ -12354,7 +12366,7 @@
         </p:blipFill>
         <p:spPr>
           <a:xfrm>
-            <a:off x="5388746" y="2409163"/>
+            <a:off x="5513034" y="2524573"/>
             <a:ext cx="1826549" cy="1826549"/>
           </a:xfrm>
           <a:prstGeom prst="rect">
@@ -12752,12 +12764,6 @@
               </a:rPr>
               <a:t>Principal Component Analysis is performed on the scaled feature data to reduce dimensionality and the new components are selected basis scree plot. </a:t>
             </a:r>
-            <a:endParaRPr lang="en-US" sz="1100" dirty="0">
-              <a:solidFill>
-                <a:srgbClr val="3B3838"/>
-              </a:solidFill>
-              <a:latin typeface="+mj-lt"/>
-            </a:endParaRPr>
           </a:p>
           <a:p>
             <a:pPr>
@@ -12780,25 +12786,7 @@
                 </a:solidFill>
                 <a:latin typeface="+mj-lt"/>
               </a:rPr>
-              <a:t>These </a:t>
-            </a:r>
-            <a:r>
-              <a:rPr lang="en-US" sz="1100" dirty="0">
-                <a:solidFill>
-                  <a:srgbClr val="3B3838"/>
-                </a:solidFill>
-                <a:latin typeface="+mj-lt"/>
-              </a:rPr>
-              <a:t>new components are used in </a:t>
-            </a:r>
-            <a:r>
-              <a:rPr lang="en-US" sz="1100" dirty="0">
-                <a:solidFill>
-                  <a:srgbClr val="3B3838"/>
-                </a:solidFill>
-                <a:latin typeface="+mj-lt"/>
-              </a:rPr>
-              <a:t>two of the models: Linear Regression and Polynomial </a:t>
+              <a:t>These new components are used in two of the models: Linear Regression and Polynomial </a:t>
             </a:r>
             <a:r>
               <a:rPr lang="en-US" sz="1100" dirty="0" smtClean="0">
@@ -13601,16 +13589,7 @@
                 </a:solidFill>
                 <a:latin typeface="+mj-lt"/>
               </a:rPr>
-              <a:t>The </a:t>
-            </a:r>
-            <a:r>
-              <a:rPr lang="en-US" sz="1100" dirty="0">
-                <a:solidFill>
-                  <a:srgbClr val="3B3838"/>
-                </a:solidFill>
-                <a:latin typeface="+mj-lt"/>
-              </a:rPr>
-              <a:t>following modeling techniques were used:</a:t>
+              <a:t>The following modeling techniques were used:</a:t>
             </a:r>
           </a:p>
           <a:p>
@@ -13730,23 +13709,8 @@
                 </a:solidFill>
                 <a:latin typeface="+mj-lt"/>
               </a:rPr>
-              <a:t>Support Vector Regression (SVR</a:t>
-            </a:r>
-            <a:r>
-              <a:rPr lang="en-US" sz="1100" b="1" dirty="0">
-                <a:solidFill>
-                  <a:srgbClr val="3B3838"/>
-                </a:solidFill>
-                <a:latin typeface="+mj-lt"/>
-              </a:rPr>
-              <a:t>)</a:t>
-            </a:r>
-            <a:endParaRPr lang="en-US" sz="1100" b="1" dirty="0">
-              <a:solidFill>
-                <a:srgbClr val="3B3838"/>
-              </a:solidFill>
-              <a:latin typeface="+mj-lt"/>
-            </a:endParaRPr>
+              <a:t>Support Vector Regression (SVR)</a:t>
+            </a:r>
           </a:p>
           <a:p>
             <a:pPr>
@@ -14085,11 +14049,7 @@
             <a:p>
               <a:r>
                 <a:rPr lang="en-US" sz="1050" b="1" dirty="0" smtClean="0"/>
-                <a:t>Defender Model </a:t>
-              </a:r>
-              <a:r>
-                <a:rPr lang="en-US" sz="1050" b="1" dirty="0" smtClean="0"/>
-                <a:t>Comparison</a:t>
+                <a:t>Defender Model Comparison</a:t>
               </a:r>
               <a:endParaRPr lang="en-GB" sz="1050" dirty="0"/>
             </a:p>
@@ -14166,11 +14126,7 @@
             <a:p>
               <a:r>
                 <a:rPr lang="en-US" sz="1050" b="1" dirty="0" smtClean="0"/>
-                <a:t>Forward Model </a:t>
-              </a:r>
-              <a:r>
-                <a:rPr lang="en-US" sz="1050" b="1" dirty="0" smtClean="0"/>
-                <a:t>Comparison</a:t>
+                <a:t>Forward Model Comparison</a:t>
               </a:r>
               <a:endParaRPr lang="en-GB" sz="1050" b="1" dirty="0"/>
             </a:p>
@@ -14225,11 +14181,7 @@
               </a:r>
               <a:r>
                 <a:rPr lang="en-US" sz="1050" b="1" smtClean="0"/>
-                <a:t>Model </a:t>
-              </a:r>
-              <a:r>
-                <a:rPr lang="en-US" sz="1050" b="1" smtClean="0"/>
-                <a:t>Comparison</a:t>
+                <a:t>Model Comparison</a:t>
               </a:r>
               <a:endParaRPr lang="en-GB" sz="1400" dirty="0"/>
             </a:p>
@@ -14280,11 +14232,7 @@
             <a:p>
               <a:r>
                 <a:rPr lang="en-US" sz="1050" b="1" dirty="0" smtClean="0"/>
-                <a:t>Goalkeeper Model </a:t>
-              </a:r>
-              <a:r>
-                <a:rPr lang="en-US" sz="1050" b="1" dirty="0" smtClean="0"/>
-                <a:t>Comparison</a:t>
+                <a:t>Goalkeeper Model Comparison</a:t>
               </a:r>
               <a:endParaRPr lang="en-GB" sz="1050" b="1" dirty="0"/>
             </a:p>
@@ -14971,16 +14919,7 @@
                 </a:solidFill>
                 <a:latin typeface="+mj-lt"/>
               </a:rPr>
-              <a:t>The </a:t>
-            </a:r>
-            <a:r>
-              <a:rPr lang="en-US" sz="1200" b="1" dirty="0">
-                <a:solidFill>
-                  <a:srgbClr val="3B3838"/>
-                </a:solidFill>
-                <a:latin typeface="+mj-lt"/>
-              </a:rPr>
-              <a:t>scatter plots of the actual vs predicted ratings for all four positions show almost negligible </a:t>
+              <a:t>The scatter plots of the actual vs predicted ratings for all four positions show almost negligible </a:t>
             </a:r>
             <a:r>
               <a:rPr lang="en-US" sz="1200" b="1" dirty="0" smtClean="0">
@@ -15245,7 +15184,7 @@
                 </a:solidFill>
                 <a:latin typeface="+mj-lt"/>
               </a:rPr>
-              <a:t>The list of these top players is available in the appendix (slide x)</a:t>
+              <a:t>The list of these top players is available in the appendix (slide 19)</a:t>
             </a:r>
           </a:p>
           <a:p>
@@ -15615,12 +15554,6 @@
               </a:rPr>
               <a:t>2017 data will be added to the analysis in the future</a:t>
             </a:r>
-            <a:endParaRPr lang="en-US" sz="700" dirty="0">
-              <a:solidFill>
-                <a:srgbClr val="3B3838"/>
-              </a:solidFill>
-              <a:latin typeface="+mj-lt"/>
-            </a:endParaRPr>
           </a:p>
         </p:txBody>
       </p:sp>
@@ -15822,16 +15755,25 @@
                 </a:solidFill>
                 <a:latin typeface="+mj-lt"/>
               </a:rPr>
-              <a:t>all historical data is available for each player. </a:t>
-            </a:r>
-            <a:r>
-              <a:rPr lang="en-US" sz="1100" dirty="0">
+              <a:t>all historical data is available for each player. Knowing that the </a:t>
+            </a:r>
+            <a:r>
+              <a:rPr lang="en-US" sz="1100" dirty="0" smtClean="0">
                 <a:solidFill>
                   <a:srgbClr val="3B3838"/>
                 </a:solidFill>
                 <a:latin typeface="+mj-lt"/>
               </a:rPr>
-              <a:t>Knowing that the FIFA Player Ranking is based on historical data of player, we do not have this data for each player. A lot of information will not be learned by the model due to the absence of this data.</a:t>
+              <a:t>FIFA (game) Player </a:t>
+            </a:r>
+            <a:r>
+              <a:rPr lang="en-US" sz="1100" dirty="0">
+                <a:solidFill>
+                  <a:srgbClr val="3B3838"/>
+                </a:solidFill>
+                <a:latin typeface="+mj-lt"/>
+              </a:rPr>
+              <a:t>Ranking is based on historical data of player, we do not have this data for each player. A lot of information will not be learned by the model due to the absence of this data.</a:t>
             </a:r>
             <a:endParaRPr lang="en-GB" sz="1100" dirty="0">
               <a:solidFill>
@@ -15857,16 +15799,7 @@
                 </a:solidFill>
                 <a:latin typeface="+mj-lt"/>
               </a:rPr>
-              <a:t>related to ranks of leagues, teams and countries is also not available in this data. </a:t>
-            </a:r>
-            <a:r>
-              <a:rPr lang="en-US" sz="1100" dirty="0">
-                <a:solidFill>
-                  <a:srgbClr val="3B3838"/>
-                </a:solidFill>
-                <a:latin typeface="+mj-lt"/>
-              </a:rPr>
-              <a:t>This information would have made the model more accurate as these factors play an important role in determining player ranking.</a:t>
+              <a:t>related to ranks of leagues, teams and countries is also not available in this data. This information would have made the model more accurate as these factors play an important role in determining player ranking.</a:t>
             </a:r>
             <a:endParaRPr lang="en-GB" sz="1100" dirty="0">
               <a:solidFill>
@@ -16479,7 +16412,7 @@
               </a:r>
               <a:r>
                 <a:rPr lang="en-US" dirty="0" smtClean="0"/>
-                <a:t>FIFA 2017 data to get current player list</a:t>
+                <a:t>FIFA 17 game data to get current player list</a:t>
               </a:r>
               <a:endParaRPr dirty="0"/>
             </a:p>
@@ -18331,11 +18264,7 @@
             </a:pPr>
             <a:r>
               <a:rPr lang="en-US" sz="900" dirty="0" smtClean="0"/>
-              <a:t>FUTURE </a:t>
-            </a:r>
-            <a:r>
-              <a:rPr lang="en-US" sz="900" dirty="0" smtClean="0"/>
-              <a:t>WORK</a:t>
+              <a:t>FUTURE WORK</a:t>
             </a:r>
           </a:p>
           <a:p>
@@ -18360,7 +18289,6 @@
               <a:rPr lang="en-US" sz="900" dirty="0" smtClean="0"/>
               <a:t>APPENDIX</a:t>
             </a:r>
-            <a:endParaRPr lang="en-US" sz="900" dirty="0" smtClean="0"/>
           </a:p>
         </p:txBody>
       </p:sp>
@@ -21193,8 +21121,8 @@
         </p:nvSpPr>
         <p:spPr>
           <a:xfrm>
-            <a:off x="256334" y="605618"/>
-            <a:ext cx="8603581" cy="4095591"/>
+            <a:off x="256334" y="573886"/>
+            <a:ext cx="8603581" cy="4127324"/>
           </a:xfrm>
           <a:prstGeom prst="rect">
             <a:avLst/>
@@ -21220,25 +21148,25 @@
               </a:defRPr>
             </a:pPr>
             <a:r>
-              <a:rPr lang="en-US" sz="1100" dirty="0">
+              <a:rPr lang="en-US" sz="1000" dirty="0" smtClean="0">
                 <a:solidFill>
                   <a:srgbClr val="3B3838"/>
                 </a:solidFill>
                 <a:latin typeface="+mj-lt"/>
               </a:rPr>
-              <a:t>The client wants a model that can predict the aggregated overall rating of a player at each age of the player. </a:t>
-            </a:r>
-            <a:r>
-              <a:rPr lang="en-US" sz="1100" dirty="0">
+              <a:t>The </a:t>
+            </a:r>
+            <a:r>
+              <a:rPr lang="en-US" sz="1000" dirty="0">
                 <a:solidFill>
                   <a:srgbClr val="3B3838"/>
                 </a:solidFill>
                 <a:latin typeface="+mj-lt"/>
               </a:rPr>
-              <a:t>In addition to the </a:t>
-            </a:r>
-            <a:r>
-              <a:rPr lang="en-US" sz="1100" b="1" dirty="0">
+              <a:t>client wants a model that can predict the aggregated overall rating of a player at each age of the player. In addition to the </a:t>
+            </a:r>
+            <a:r>
+              <a:rPr lang="en-US" sz="1000" b="1" dirty="0">
                 <a:solidFill>
                   <a:srgbClr val="3B3838"/>
                 </a:solidFill>
@@ -21247,7 +21175,7 @@
               <a:t>list of top players at playing positions </a:t>
             </a:r>
             <a:r>
-              <a:rPr lang="en-US" sz="1100" dirty="0">
+              <a:rPr lang="en-US" sz="1000" dirty="0">
                 <a:solidFill>
                   <a:srgbClr val="3B3838"/>
                 </a:solidFill>
@@ -21256,7 +21184,7 @@
               <a:t>they also want to know </a:t>
             </a:r>
             <a:r>
-              <a:rPr lang="en-US" sz="1100" b="1" dirty="0">
+              <a:rPr lang="en-US" sz="1000" b="1" dirty="0">
                 <a:solidFill>
                   <a:srgbClr val="3B3838"/>
                 </a:solidFill>
@@ -21265,7 +21193,7 @@
               <a:t>the significant attributes that affect the player rating for each </a:t>
             </a:r>
             <a:r>
-              <a:rPr lang="en-US" sz="1100" b="1" dirty="0" smtClean="0">
+              <a:rPr lang="en-US" sz="1000" b="1" dirty="0" smtClean="0">
                 <a:solidFill>
                   <a:srgbClr val="3B3838"/>
                 </a:solidFill>
@@ -21273,7 +21201,7 @@
               </a:rPr>
               <a:t>position</a:t>
             </a:r>
-            <a:endParaRPr lang="en-GB" sz="1100" dirty="0">
+            <a:endParaRPr lang="en-GB" sz="1000" dirty="0">
               <a:solidFill>
                 <a:srgbClr val="3B3838"/>
               </a:solidFill>
@@ -21295,7 +21223,7 @@
               </a:defRPr>
             </a:pPr>
             <a:r>
-              <a:rPr lang="en-US" sz="1100" dirty="0">
+              <a:rPr lang="en-US" sz="1000" b="1" dirty="0">
                 <a:solidFill>
                   <a:srgbClr val="3B3838"/>
                 </a:solidFill>
@@ -21304,7 +21232,7 @@
               <a:t>P</a:t>
             </a:r>
             <a:r>
-              <a:rPr lang="en-US" sz="1100" dirty="0" smtClean="0">
+              <a:rPr lang="en-US" sz="1000" b="1" dirty="0" smtClean="0">
                 <a:solidFill>
                   <a:srgbClr val="3B3838"/>
                 </a:solidFill>
@@ -21313,24 +21241,69 @@
               <a:t>layer </a:t>
             </a:r>
             <a:r>
-              <a:rPr lang="en-US" sz="1100" dirty="0">
+              <a:rPr lang="en-US" sz="1000" b="1" dirty="0">
                 <a:solidFill>
                   <a:srgbClr val="3B3838"/>
                 </a:solidFill>
                 <a:latin typeface="+mj-lt"/>
               </a:rPr>
-              <a:t>ratings are calculated by FIFA based on player attribute stats as well as other factors such as the league the player is associated with, the specific circumstances which resulted in an attribute score and various other </a:t>
-            </a:r>
-            <a:r>
-              <a:rPr lang="en-US" sz="1100" dirty="0" smtClean="0">
+              <a:t>ratings are calculated </a:t>
+            </a:r>
+            <a:r>
+              <a:rPr lang="en-US" sz="1000" b="1" dirty="0" smtClean="0">
                 <a:solidFill>
                   <a:srgbClr val="3B3838"/>
                 </a:solidFill>
                 <a:latin typeface="+mj-lt"/>
               </a:rPr>
-              <a:t>factors</a:t>
-            </a:r>
-            <a:endParaRPr lang="en-US" sz="1100" dirty="0">
+              <a:t>based </a:t>
+            </a:r>
+            <a:r>
+              <a:rPr lang="en-US" sz="1000" b="1" dirty="0">
+                <a:solidFill>
+                  <a:srgbClr val="3B3838"/>
+                </a:solidFill>
+                <a:latin typeface="+mj-lt"/>
+              </a:rPr>
+              <a:t>on player attribute stats as well as other factors </a:t>
+            </a:r>
+            <a:r>
+              <a:rPr lang="en-US" sz="1000" dirty="0">
+                <a:solidFill>
+                  <a:srgbClr val="3B3838"/>
+                </a:solidFill>
+                <a:latin typeface="+mj-lt"/>
+              </a:rPr>
+              <a:t>such as the league the player is associated with, the specific circumstances which resulted in an attribute score and various other </a:t>
+            </a:r>
+            <a:r>
+              <a:rPr lang="en-US" sz="1000" dirty="0" smtClean="0">
+                <a:solidFill>
+                  <a:srgbClr val="3B3838"/>
+                </a:solidFill>
+                <a:latin typeface="+mj-lt"/>
+              </a:rPr>
+              <a:t>factors, this data (attribute and rating) is made available </a:t>
+            </a:r>
+            <a:r>
+              <a:rPr lang="en-US" sz="1000" dirty="0">
+                <a:solidFill>
+                  <a:srgbClr val="3B3838"/>
+                </a:solidFill>
+                <a:latin typeface="+mj-lt"/>
+              </a:rPr>
+              <a:t>by EA Sports FIFA </a:t>
+            </a:r>
+            <a:r>
+              <a:rPr lang="en-US" sz="1000" dirty="0" smtClean="0">
+                <a:solidFill>
+                  <a:srgbClr val="3B3838"/>
+                </a:solidFill>
+                <a:latin typeface="+mj-lt"/>
+              </a:rPr>
+              <a:t>(game)</a:t>
+            </a:r>
+            <a:endParaRPr lang="en-US" sz="1000" dirty="0">
               <a:solidFill>
                 <a:srgbClr val="3B3838"/>
               </a:solidFill>
@@ -21352,7 +21325,7 @@
               </a:defRPr>
             </a:pPr>
             <a:r>
-              <a:rPr lang="en-US" sz="1100" dirty="0" smtClean="0">
+              <a:rPr lang="en-US" sz="1000" dirty="0" smtClean="0">
                 <a:solidFill>
                   <a:srgbClr val="3B3838"/>
                 </a:solidFill>
@@ -21361,14 +21334,59 @@
               <a:t>Our aim is to </a:t>
             </a:r>
             <a:r>
-              <a:rPr lang="en-US" sz="1100" b="1" dirty="0" smtClean="0">
+              <a:rPr lang="en-US" sz="1000" b="1" dirty="0" smtClean="0">
                 <a:solidFill>
                   <a:srgbClr val="3B3838"/>
                 </a:solidFill>
                 <a:latin typeface="+mj-lt"/>
               </a:rPr>
-              <a:t>predict these ratings based only on the player attribute stats available to us from the FIFA video game data</a:t>
-            </a:r>
+              <a:t>predict these ratings based only on the player attribute stats available to us from the FIFA game data </a:t>
+            </a:r>
+            <a:r>
+              <a:rPr lang="en-US" sz="1000" dirty="0" smtClean="0">
+                <a:solidFill>
+                  <a:srgbClr val="3B3838"/>
+                </a:solidFill>
+                <a:latin typeface="+mj-lt"/>
+              </a:rPr>
+              <a:t>and use these predicted ratings to </a:t>
+            </a:r>
+            <a:r>
+              <a:rPr lang="en-US" sz="1000" b="1" dirty="0" smtClean="0">
+                <a:solidFill>
+                  <a:srgbClr val="3B3838"/>
+                </a:solidFill>
+                <a:latin typeface="+mj-lt"/>
+              </a:rPr>
+              <a:t>identify the top players in each position</a:t>
+            </a:r>
+            <a:endParaRPr lang="en-US" sz="1000" dirty="0" smtClean="0">
+              <a:solidFill>
+                <a:srgbClr val="3B3838"/>
+              </a:solidFill>
+              <a:latin typeface="+mj-lt"/>
+            </a:endParaRPr>
+          </a:p>
+          <a:p>
+            <a:pPr>
+              <a:lnSpc>
+                <a:spcPct val="100000"/>
+              </a:lnSpc>
+              <a:spcBef>
+                <a:spcPts val="600"/>
+              </a:spcBef>
+              <a:defRPr sz="1100">
+                <a:solidFill>
+                  <a:srgbClr val="3B3838"/>
+                </a:solidFill>
+              </a:defRPr>
+            </a:pPr>
+            <a:endParaRPr lang="en-US" sz="1000" b="1" dirty="0" smtClean="0">
+              <a:solidFill>
+                <a:srgbClr val="3B3838"/>
+              </a:solidFill>
+              <a:latin typeface="+mj-lt"/>
+            </a:endParaRPr>
           </a:p>
         </p:txBody>
       </p:sp>
@@ -21710,10 +21728,10 @@
         </p:nvGrpSpPr>
         <p:grpSpPr>
           <a:xfrm>
-            <a:off x="700217" y="1683568"/>
-            <a:ext cx="4146990" cy="2952087"/>
-            <a:chOff x="256334" y="1674690"/>
-            <a:chExt cx="4146990" cy="2952087"/>
+            <a:off x="709095" y="1870324"/>
+            <a:ext cx="4146990" cy="2891548"/>
+            <a:chOff x="256334" y="1735229"/>
+            <a:chExt cx="4146990" cy="2891548"/>
           </a:xfrm>
         </p:grpSpPr>
         <p:pic>
@@ -22412,7 +22430,7 @@
           </p:nvSpPr>
           <p:spPr>
             <a:xfrm>
-              <a:off x="1499847" y="1674690"/>
+              <a:off x="1122466" y="1735229"/>
               <a:ext cx="1553592" cy="292386"/>
             </a:xfrm>
             <a:prstGeom prst="rect">
@@ -23438,16 +23456,7 @@
                 </a:solidFill>
                 <a:latin typeface="+mj-lt"/>
               </a:rPr>
-              <a:t>Country</a:t>
-            </a:r>
-            <a:r>
-              <a:rPr lang="en-US" sz="1100" b="1" dirty="0">
-                <a:solidFill>
-                  <a:srgbClr val="3B3838"/>
-                </a:solidFill>
-                <a:latin typeface="+mj-lt"/>
-              </a:rPr>
-              <a:t>: </a:t>
+              <a:t>Country: </a:t>
             </a:r>
             <a:r>
               <a:rPr lang="en-US" sz="1100" dirty="0" err="1">
@@ -23495,16 +23504,7 @@
                 </a:solidFill>
                 <a:latin typeface="+mj-lt"/>
               </a:rPr>
-              <a:t>League</a:t>
-            </a:r>
-            <a:r>
-              <a:rPr lang="en-US" sz="1100" b="1" dirty="0">
-                <a:solidFill>
-                  <a:srgbClr val="3B3838"/>
-                </a:solidFill>
-                <a:latin typeface="+mj-lt"/>
-              </a:rPr>
-              <a:t>: </a:t>
+              <a:t>League: </a:t>
             </a:r>
             <a:r>
               <a:rPr lang="en-US" sz="1100" dirty="0">
@@ -25051,12 +25051,6 @@
               </a:rPr>
               <a:t>Boxplot shows mean difference between groups</a:t>
             </a:r>
-            <a:endParaRPr lang="en-US" sz="1000" dirty="0">
-              <a:solidFill>
-                <a:srgbClr val="3B3838"/>
-              </a:solidFill>
-              <a:latin typeface="+mj-lt"/>
-            </a:endParaRPr>
           </a:p>
         </p:txBody>
       </p:sp>

</xml_diff>

<commit_message>
add link to ipynb, slide and report
</commit_message>
<xml_diff>
--- a/Capstone_Final_Report/capstone_project_slide_soccer.pptx
+++ b/Capstone_Final_Report/capstone_project_slide_soccer.pptx
@@ -479,11 +479,11 @@
         </c:dLbls>
         <c:marker val="1"/>
         <c:smooth val="0"/>
-        <c:axId val="803751184"/>
-        <c:axId val="893598640"/>
+        <c:axId val="1733874464"/>
+        <c:axId val="1733914752"/>
       </c:lineChart>
       <c:catAx>
-        <c:axId val="803751184"/>
+        <c:axId val="1733874464"/>
         <c:scaling>
           <c:orientation val="minMax"/>
         </c:scaling>
@@ -529,7 +529,7 @@
             <a:endParaRPr lang="en-US"/>
           </a:p>
         </c:txPr>
-        <c:crossAx val="893598640"/>
+        <c:crossAx val="1733914752"/>
         <c:crosses val="autoZero"/>
         <c:auto val="1"/>
         <c:lblAlgn val="ctr"/>
@@ -537,7 +537,7 @@
         <c:noMultiLvlLbl val="0"/>
       </c:catAx>
       <c:valAx>
-        <c:axId val="893598640"/>
+        <c:axId val="1733914752"/>
         <c:scaling>
           <c:orientation val="minMax"/>
         </c:scaling>
@@ -546,7 +546,7 @@
         <c:majorTickMark val="none"/>
         <c:minorTickMark val="none"/>
         <c:tickLblPos val="nextTo"/>
-        <c:crossAx val="803751184"/>
+        <c:crossAx val="1733874464"/>
         <c:crosses val="autoZero"/>
         <c:crossBetween val="between"/>
       </c:valAx>
@@ -12233,7 +12233,7 @@
         </p:nvSpPr>
         <p:spPr/>
         <p:txBody>
-          <a:bodyPr>
+          <a:bodyPr anchor="t">
             <a:normAutofit/>
           </a:bodyPr>
           <a:lstStyle/>
@@ -12285,8 +12285,12 @@
           <a:p>
             <a:pPr algn="l"/>
             <a:r>
+              <a:rPr lang="en-US" sz="900" b="1" i="1" dirty="0" smtClean="0"/>
+              <a:t>Springboard </a:t>
+            </a:r>
+            <a:r>
               <a:rPr lang="en-US" sz="900" b="1" i="1" dirty="0"/>
-              <a:t>Springboard Intermediate Data Science: Python</a:t>
+              <a:t>Intermediate Data Science: Python</a:t>
             </a:r>
             <a:endParaRPr lang="en-GB" sz="900" b="1" dirty="0"/>
           </a:p>
@@ -12314,29 +12318,53 @@
             <a:pPr algn="l"/>
             <a:r>
               <a:rPr lang="en-US" sz="900" i="1" dirty="0"/>
-              <a:t>Mentor: Raghunandan </a:t>
-            </a:r>
-            <a:r>
-              <a:rPr lang="en-US" sz="900" i="1" dirty="0" smtClean="0"/>
+              <a:t>Mentor: </a:t>
+            </a:r>
+            <a:r>
+              <a:rPr lang="en-US" sz="900" i="1" dirty="0" err="1"/>
+              <a:t>Raghunandan</a:t>
+            </a:r>
+            <a:r>
+              <a:rPr lang="en-US" sz="900" i="1" dirty="0"/>
+              <a:t> </a:t>
+            </a:r>
+            <a:r>
+              <a:rPr lang="en-US" sz="900" i="1" dirty="0" err="1" smtClean="0"/>
               <a:t>Patthar</a:t>
             </a:r>
-            <a:endParaRPr lang="en-GB" sz="900" dirty="0"/>
+            <a:endParaRPr lang="en-US" sz="900" i="1" dirty="0" smtClean="0"/>
           </a:p>
           <a:p>
             <a:pPr algn="l"/>
             <a:r>
-              <a:rPr lang="en-US" sz="900" dirty="0"/>
+              <a:rPr lang="en-US" sz="900" i="1" dirty="0" smtClean="0">
+                <a:hlinkClick r:id="rId2"/>
+              </a:rPr>
+              <a:t>Link to Project Code (ipynb)</a:t>
+            </a:r>
+            <a:endParaRPr lang="en-US" sz="900" i="1" dirty="0" smtClean="0"/>
+          </a:p>
+          <a:p>
+            <a:pPr algn="l"/>
+            <a:r>
+              <a:rPr lang="en-US" sz="900" i="1" dirty="0" smtClean="0">
+                <a:hlinkClick r:id="rId3"/>
+              </a:rPr>
+              <a:t>Link to </a:t>
+            </a:r>
+            <a:r>
+              <a:rPr lang="en-US" sz="900" i="1" dirty="0">
+                <a:hlinkClick r:id="rId3"/>
+              </a:rPr>
+              <a:t>Project Report (pdf)</a:t>
+            </a:r>
+            <a:r>
+              <a:rPr lang="en-US" sz="900" i="1" dirty="0">
+                <a:hlinkClick r:id="rId3"/>
+              </a:rPr>
               <a:t> </a:t>
             </a:r>
-            <a:endParaRPr lang="en-GB" sz="900" dirty="0"/>
-          </a:p>
-          <a:p>
-            <a:pPr algn="r"/>
-            <a:r>
-              <a:rPr lang="en-US" sz="900" b="1" dirty="0"/>
-              <a:t>October 2017</a:t>
-            </a:r>
-            <a:endParaRPr lang="en-GB" sz="900" dirty="0"/>
+            <a:endParaRPr lang="en-GB" sz="900" i="1" dirty="0"/>
           </a:p>
           <a:p>
             <a:pPr algn="l"/>
@@ -12353,7 +12381,7 @@
           <p:nvPr/>
         </p:nvPicPr>
         <p:blipFill>
-          <a:blip r:embed="rId2">
+          <a:blip r:embed="rId4">
             <a:extLst>
               <a:ext uri="{28A0092B-C50C-407E-A947-70E740481C1C}">
                 <a14:useLocalDpi xmlns:a14="http://schemas.microsoft.com/office/drawing/2010/main" val="0"/>
@@ -12366,7 +12394,7 @@
         </p:blipFill>
         <p:spPr>
           <a:xfrm>
-            <a:off x="5513034" y="2524573"/>
+            <a:off x="5699465" y="2409163"/>
             <a:ext cx="1826549" cy="1826549"/>
           </a:xfrm>
           <a:prstGeom prst="rect">
@@ -12374,6 +12402,70 @@
           </a:prstGeom>
         </p:spPr>
       </p:pic>
+      <p:sp>
+        <p:nvSpPr>
+          <p:cNvPr id="5" name="TextBox 4"/>
+          <p:cNvSpPr txBox="1"/>
+          <p:nvPr/>
+        </p:nvSpPr>
+        <p:spPr>
+          <a:xfrm>
+            <a:off x="7066625" y="3745161"/>
+            <a:ext cx="934375" cy="230830"/>
+          </a:xfrm>
+          <a:prstGeom prst="rect">
+            <a:avLst/>
+          </a:prstGeom>
+          <a:noFill/>
+          <a:ln w="12700" cap="flat">
+            <a:noFill/>
+            <a:miter lim="400000"/>
+          </a:ln>
+          <a:effectLst/>
+          <a:sp3d/>
+        </p:spPr>
+        <p:style>
+          <a:lnRef idx="0">
+            <a:scrgbClr r="0" g="0" b="0"/>
+          </a:lnRef>
+          <a:fillRef idx="0">
+            <a:scrgbClr r="0" g="0" b="0"/>
+          </a:fillRef>
+          <a:effectRef idx="0">
+            <a:scrgbClr r="0" g="0" b="0"/>
+          </a:effectRef>
+          <a:fontRef idx="none"/>
+        </p:style>
+        <p:txBody>
+          <a:bodyPr rot="0" spcFirstLastPara="1" vertOverflow="overflow" horzOverflow="overflow" vert="horz" wrap="square" lIns="45719" tIns="45719" rIns="45719" bIns="45719" numCol="1" spcCol="38100" rtlCol="0" anchor="t">
+            <a:spAutoFit/>
+          </a:bodyPr>
+          <a:lstStyle/>
+          <a:p>
+            <a:pPr marL="0" marR="0" indent="0" algn="l" defTabSz="685800" rtl="0" fontAlgn="auto" latinLnBrk="0" hangingPunct="0">
+              <a:lnSpc>
+                <a:spcPct val="100000"/>
+              </a:lnSpc>
+              <a:spcBef>
+                <a:spcPts val="0"/>
+              </a:spcBef>
+              <a:spcAft>
+                <a:spcPts val="0"/>
+              </a:spcAft>
+              <a:buClrTx/>
+              <a:buSzTx/>
+              <a:buFontTx/>
+              <a:buNone/>
+              <a:tabLst/>
+            </a:pPr>
+            <a:r>
+              <a:rPr lang="en-US" sz="900" b="1" i="1" dirty="0"/>
+              <a:t>October 2017</a:t>
+            </a:r>
+            <a:endParaRPr lang="en-US" sz="900" b="1" i="1" dirty="0"/>
+          </a:p>
+        </p:txBody>
+      </p:sp>
     </p:spTree>
     <p:extLst>
       <p:ext uri="{BB962C8B-B14F-4D97-AF65-F5344CB8AC3E}">

</xml_diff>